<commit_message>
Notizen hinzugefügt: Risikomanagementansätzen, Gesetze
</commit_message>
<xml_diff>
--- a/Rheinmetall_Präsentation.pptx
+++ b/Rheinmetall_Präsentation.pptx
@@ -1131,7 +1131,288 @@
           <a:p>
             <a:r>
               <a:rPr lang="de-DE" dirty="0"/>
-              <a:t>Durch das 2022 beschlossene Sondervermögen von 100 Milliarden € ließen sich lang aufgeschobene Großprojekte realisieren, diese könnten kurzfristig allerdings auch zu kurzfristigem Personalmangel führen. Da so der Großteil des Geldes allerdings auch von einigen wenigen Akteuren kommt, ist das Unternehmen stark abhängig. </a:t>
+              <a:t>Insgesamt wurde das Risiko vom Vorjahr herabgestuft, zum einen, da sich das Unternehmen im Automobilmarkt transformiert hat, zum anderen, da mehr in den Verteidigungssektor investiert wurde.</a:t>
+            </a:r>
+          </a:p>
+          <a:p>
+            <a:pPr marL="0" marR="0" lvl="0" indent="0" algn="l" defTabSz="914400" rtl="0" eaLnBrk="1" fontAlgn="auto" latinLnBrk="0" hangingPunct="1">
+              <a:lnSpc>
+                <a:spcPct val="100000"/>
+              </a:lnSpc>
+              <a:spcBef>
+                <a:spcPts val="0"/>
+              </a:spcBef>
+              <a:spcAft>
+                <a:spcPts val="0"/>
+              </a:spcAft>
+              <a:buClrTx/>
+              <a:buSzTx/>
+              <a:buFontTx/>
+              <a:buNone/>
+              <a:tabLst/>
+              <a:defRPr/>
+            </a:pPr>
+            <a:r>
+              <a:rPr lang="de-DE" b="0" i="0" dirty="0">
+                <a:solidFill>
+                  <a:srgbClr val="BDC1C6"/>
+                </a:solidFill>
+                <a:effectLst/>
+                <a:latin typeface="Google Sans"/>
+              </a:rPr>
+              <a:t>Energiekrise und Klimawandel als indirektes Risiko für die Automobilindustrie.</a:t>
+            </a:r>
+            <a:endParaRPr lang="de-DE" dirty="0"/>
+          </a:p>
+          <a:p>
+            <a:r>
+              <a:rPr lang="de-DE" dirty="0"/>
+              <a:t>Durch das 2022 beschlossene Sondervermögen von 100 Milliarden € ließen sich lang aufgeschobene Großprojekte realisieren, diese könnten kurzfristig allerdings auch zu kurzfristigem Personalmangel führen. Da so der Großteil des Geldes allerdings auch von einigen wenigen Akteuren kommt, ist das Unternehmen stark abhängig. So sind bspw. Wenige nationale und internationale Behörden fast vollständig für die Einnahmen der Divisionen </a:t>
+            </a:r>
+            <a:r>
+              <a:rPr lang="en-US" dirty="0"/>
+              <a:t>Vehicle Systems, Weapon and Ammunition </a:t>
+            </a:r>
+            <a:r>
+              <a:rPr lang="en-US" dirty="0" err="1"/>
+              <a:t>sowie</a:t>
+            </a:r>
+            <a:r>
+              <a:rPr lang="en-US" dirty="0"/>
+              <a:t> Electronic Solutions </a:t>
+            </a:r>
+            <a:r>
+              <a:rPr lang="en-US" dirty="0" err="1"/>
+              <a:t>verantwortlich</a:t>
+            </a:r>
+            <a:r>
+              <a:rPr lang="en-US" dirty="0"/>
+              <a:t>. </a:t>
+            </a:r>
+          </a:p>
+          <a:p>
+            <a:pPr algn="l">
+              <a:buFont typeface="Arial" panose="020B0604020202020204" pitchFamily="34" charset="0"/>
+              <a:buNone/>
+            </a:pPr>
+            <a:r>
+              <a:rPr lang="de-DE" dirty="0"/>
+              <a:t>Zu den Wettbewerbern zählen unter anderem </a:t>
+            </a:r>
+            <a:r>
+              <a:rPr lang="de-DE" b="0" i="0" dirty="0">
+                <a:solidFill>
+                  <a:srgbClr val="BDC1C6"/>
+                </a:solidFill>
+                <a:effectLst/>
+                <a:latin typeface="Google Sans"/>
+              </a:rPr>
+              <a:t>Airbus und Thyssen-Krupp. Da der Markt allerdings so stark reguliert ist kann nicht einfach einen neuer Spieler zur Konkurrenz werden. </a:t>
+            </a:r>
+          </a:p>
+          <a:p>
+            <a:pPr algn="l">
+              <a:buFont typeface="Arial" panose="020B0604020202020204" pitchFamily="34" charset="0"/>
+              <a:buNone/>
+            </a:pPr>
+            <a:r>
+              <a:rPr lang="de-DE" b="0" i="0" dirty="0">
+                <a:solidFill>
+                  <a:srgbClr val="BDC1C6"/>
+                </a:solidFill>
+                <a:effectLst/>
+                <a:latin typeface="Google Sans"/>
+              </a:rPr>
+              <a:t>Anders sieht es auf den internationalen Märkten aus, da der transatlantische Wettbewerb zunehmend von Bedeutung gewinnt.</a:t>
+            </a:r>
+          </a:p>
+          <a:p>
+            <a:pPr algn="l">
+              <a:buFont typeface="Arial" panose="020B0604020202020204" pitchFamily="34" charset="0"/>
+              <a:buNone/>
+            </a:pPr>
+            <a:endParaRPr lang="de-DE" b="0" i="0" dirty="0">
+              <a:solidFill>
+                <a:srgbClr val="BDC1C6"/>
+              </a:solidFill>
+              <a:effectLst/>
+              <a:latin typeface="Google Sans"/>
+            </a:endParaRPr>
+          </a:p>
+          <a:p>
+            <a:pPr algn="l">
+              <a:buFont typeface="Arial" panose="020B0604020202020204" pitchFamily="34" charset="0"/>
+              <a:buNone/>
+            </a:pPr>
+            <a:r>
+              <a:rPr lang="de-DE" b="0" i="0" dirty="0">
+                <a:solidFill>
+                  <a:srgbClr val="BDC1C6"/>
+                </a:solidFill>
+                <a:effectLst/>
+                <a:latin typeface="Google Sans"/>
+              </a:rPr>
+              <a:t>Risikostreuung in große Wirtschafträume: Europa, Amerika, Asien</a:t>
+            </a:r>
+          </a:p>
+          <a:p>
+            <a:pPr algn="l">
+              <a:buFont typeface="Arial" panose="020B0604020202020204" pitchFamily="34" charset="0"/>
+              <a:buNone/>
+            </a:pPr>
+            <a:endParaRPr lang="de-DE" b="0" i="0" dirty="0">
+              <a:solidFill>
+                <a:srgbClr val="BDC1C6"/>
+              </a:solidFill>
+              <a:effectLst/>
+              <a:latin typeface="Google Sans"/>
+            </a:endParaRPr>
+          </a:p>
+          <a:p>
+            <a:pPr algn="l">
+              <a:buFont typeface="Arial" panose="020B0604020202020204" pitchFamily="34" charset="0"/>
+              <a:buNone/>
+            </a:pPr>
+            <a:r>
+              <a:rPr lang="de-DE" b="0" i="0" dirty="0">
+                <a:solidFill>
+                  <a:srgbClr val="BDC1C6"/>
+                </a:solidFill>
+                <a:effectLst/>
+                <a:latin typeface="Google Sans"/>
+              </a:rPr>
+              <a:t>Kriminalität und Terrorismus werden mit Prävention begegnet, z.B. Reiseverboten für Mitarbeiter</a:t>
+            </a:r>
+          </a:p>
+          <a:p>
+            <a:pPr algn="l">
+              <a:buFont typeface="Arial" panose="020B0604020202020204" pitchFamily="34" charset="0"/>
+              <a:buNone/>
+            </a:pPr>
+            <a:r>
+              <a:rPr lang="de-DE" b="0" i="0" dirty="0">
+                <a:solidFill>
+                  <a:srgbClr val="BDC1C6"/>
+                </a:solidFill>
+                <a:effectLst/>
+                <a:latin typeface="Google Sans"/>
+              </a:rPr>
+              <a:t>Cybervorfälle zwar nicht aufgeführt, aber im Jahresbericht schon eine hohe Bedeutung (Cloud Systeme, </a:t>
+            </a:r>
+            <a:r>
+              <a:rPr lang="de-DE" b="0" i="0" dirty="0" err="1">
+                <a:solidFill>
+                  <a:srgbClr val="BDC1C6"/>
+                </a:solidFill>
+                <a:effectLst/>
+                <a:latin typeface="Google Sans"/>
+              </a:rPr>
+              <a:t>lizenzen</a:t>
+            </a:r>
+            <a:r>
+              <a:rPr lang="de-DE" b="0" i="0" dirty="0">
+                <a:solidFill>
+                  <a:srgbClr val="BDC1C6"/>
+                </a:solidFill>
+                <a:effectLst/>
+                <a:latin typeface="Google Sans"/>
+              </a:rPr>
+              <a:t> bei anderen Unternehmen etc.)</a:t>
+            </a:r>
+          </a:p>
+          <a:p>
+            <a:pPr algn="l">
+              <a:buFont typeface="Arial" panose="020B0604020202020204" pitchFamily="34" charset="0"/>
+              <a:buNone/>
+            </a:pPr>
+            <a:r>
+              <a:rPr lang="de-DE" b="0" i="0" dirty="0" err="1">
+                <a:solidFill>
+                  <a:srgbClr val="BDC1C6"/>
+                </a:solidFill>
+                <a:effectLst/>
+                <a:latin typeface="Google Sans"/>
+              </a:rPr>
+              <a:t>Compliante</a:t>
+            </a:r>
+            <a:r>
+              <a:rPr lang="de-DE" b="0" i="0" dirty="0">
+                <a:solidFill>
+                  <a:srgbClr val="BDC1C6"/>
+                </a:solidFill>
+                <a:effectLst/>
+                <a:latin typeface="Google Sans"/>
+              </a:rPr>
+              <a:t> Verstöße</a:t>
+            </a:r>
+          </a:p>
+          <a:p>
+            <a:pPr algn="l">
+              <a:buFont typeface="Arial" panose="020B0604020202020204" pitchFamily="34" charset="0"/>
+              <a:buNone/>
+            </a:pPr>
+            <a:endParaRPr lang="de-DE" b="0" i="0" dirty="0">
+              <a:solidFill>
+                <a:srgbClr val="BDC1C6"/>
+              </a:solidFill>
+              <a:effectLst/>
+              <a:latin typeface="Google Sans"/>
+            </a:endParaRPr>
+          </a:p>
+          <a:p>
+            <a:pPr algn="l">
+              <a:buFont typeface="Arial" panose="020B0604020202020204" pitchFamily="34" charset="0"/>
+              <a:buNone/>
+            </a:pPr>
+            <a:r>
+              <a:rPr lang="de-DE" b="0" i="0" dirty="0">
+                <a:solidFill>
+                  <a:srgbClr val="BDC1C6"/>
+                </a:solidFill>
+                <a:effectLst/>
+                <a:latin typeface="Google Sans"/>
+              </a:rPr>
+              <a:t>Spezifische Risiken: Bindung an langfristige Großprojekte ( Beispiel hier Puma)</a:t>
+            </a:r>
+          </a:p>
+          <a:p>
+            <a:pPr algn="l">
+              <a:buFont typeface="Arial" panose="020B0604020202020204" pitchFamily="34" charset="0"/>
+              <a:buNone/>
+            </a:pPr>
+            <a:r>
+              <a:rPr lang="de-DE" dirty="0"/>
+              <a:t>älter werdenden Belegschaft</a:t>
+            </a:r>
+            <a:r>
+              <a:rPr lang="de-DE" b="0" i="0" dirty="0">
+                <a:solidFill>
+                  <a:srgbClr val="BDC1C6"/>
+                </a:solidFill>
+                <a:effectLst/>
+                <a:latin typeface="Google Sans"/>
+              </a:rPr>
+              <a:t>: regelmäßige </a:t>
+            </a:r>
+            <a:r>
+              <a:rPr lang="de-DE" b="0" i="0" dirty="0" err="1">
+                <a:solidFill>
+                  <a:srgbClr val="BDC1C6"/>
+                </a:solidFill>
+                <a:effectLst/>
+                <a:latin typeface="Google Sans"/>
+              </a:rPr>
+              <a:t>Alterstrukturanalysen</a:t>
+            </a:r>
+            <a:r>
+              <a:rPr lang="de-DE" b="0" i="0" dirty="0">
+                <a:solidFill>
+                  <a:srgbClr val="BDC1C6"/>
+                </a:solidFill>
+                <a:effectLst/>
+                <a:latin typeface="Google Sans"/>
+              </a:rPr>
+              <a:t> : Wissen darf nicht verloren gehen</a:t>
             </a:r>
           </a:p>
         </p:txBody>
@@ -1234,6 +1515,44 @@
               <a:t>Durch das 2022 beschlossene Sondervermögen von 100 Milliarden € ließen sich lang aufgeschobene Großprojekte realisieren, diese könnten kurzfristig allerdings auch zu kurzfristigem Personalmangel führen. Da</a:t>
             </a:r>
           </a:p>
+          <a:p>
+            <a:endParaRPr lang="de-DE" dirty="0"/>
+          </a:p>
+          <a:p>
+            <a:endParaRPr lang="de-DE" dirty="0"/>
+          </a:p>
+          <a:p>
+            <a:r>
+              <a:rPr lang="de-DE" dirty="0"/>
+              <a:t>Zur Vermeidung von Qualitätsrisiken werden darüber hinaus unter anderem Methoden wie Six Sigma, Lean Management oder Fehlermöglichkeits- und Einflussanalyse (FMEA) eingesetzt</a:t>
+            </a:r>
+          </a:p>
+          <a:p>
+            <a:endParaRPr lang="de-DE" dirty="0"/>
+          </a:p>
+          <a:p>
+            <a:r>
+              <a:rPr lang="de-DE" dirty="0"/>
+              <a:t>Aus dem Umfang von Großprojekten, deren Langläufigkeit über mehrere Jahre und deren Komplexität könnten insbesondere in den Divisionen Vehicle Systems, Weapon and </a:t>
+            </a:r>
+            <a:r>
+              <a:rPr lang="de-DE" dirty="0" err="1"/>
+              <a:t>Ammunition</a:t>
+            </a:r>
+            <a:r>
+              <a:rPr lang="de-DE" dirty="0"/>
+              <a:t> sowie Electronic Solutions bei der Planung, Kalkulation, Ausführung und Abwicklung Risiken entstehen.</a:t>
+            </a:r>
+          </a:p>
+          <a:p>
+            <a:endParaRPr lang="de-DE" dirty="0"/>
+          </a:p>
+          <a:p>
+            <a:r>
+              <a:rPr lang="de-DE" dirty="0"/>
+              <a:t>Mit der EU-Datenschutzgrundverordnung (DSGVO) wurden im Jahr 2018 auch umfangreiche Pflichten für den Datenschutz für Unternehmen in der EU wirksam. Verstöße gegen die DSGVO sind mit erheblichen Sanktionen belegt. Unter anderem können Bußgelder von bis zu 4% des weltweiten Konzernumsatzes verhängt werden. Um diesen Risiken zu begegnen, haben wir ein konzernweites Datenschutzmanagementsystem (DSMS) etabliert, das ein strukturiertes, sicheres und möglichst einheitliches Datenschutzniveau gewährleistet.</a:t>
+            </a:r>
+          </a:p>
         </p:txBody>
       </p:sp>
       <p:sp>
@@ -1591,10 +1910,9 @@
           <a:lstStyle/>
           <a:p>
             <a:r>
-              <a:rPr lang="de-DE"/>
+              <a:rPr lang="de-DE" dirty="0"/>
               <a:t>Linus</a:t>
             </a:r>
-            <a:endParaRPr lang="de-DE" dirty="0"/>
           </a:p>
         </p:txBody>
       </p:sp>
@@ -2032,6 +2350,26 @@
               <a:t>Jolan Eggers</a:t>
             </a:r>
           </a:p>
+          <a:p>
+            <a:r>
+              <a:rPr lang="de-DE" dirty="0"/>
+              <a:t>Um euch das Unternehmen noch einmal genauer Vorzustellen, zeige ich euch jetzt die 5 Grundpfeiler in die sich das Unternehmen aufteilt, sowie deren größten Abnehmer vor. </a:t>
+            </a:r>
+          </a:p>
+          <a:p>
+            <a:r>
+              <a:rPr lang="de-DE" dirty="0"/>
+              <a:t>Dazu ist zu sagen, dass es sich nur um das Rheinmetall Kerngeschäft handelt, wie ich euch gleich noch zeige, hat das Unternehmen noch unzählige </a:t>
+            </a:r>
+            <a:r>
+              <a:rPr lang="de-DE" dirty="0" err="1"/>
+              <a:t>Subunternhemen</a:t>
+            </a:r>
+            <a:r>
+              <a:rPr lang="de-DE" dirty="0"/>
+              <a:t> oder Anteile an anderen Aktiengesellschaften.</a:t>
+            </a:r>
+          </a:p>
         </p:txBody>
       </p:sp>
       <p:sp>
@@ -2504,7 +2842,7 @@
                 <a:effectLst/>
                 <a:latin typeface="arial" panose="020B0604020202020204" pitchFamily="34" charset="0"/>
               </a:rPr>
-              <a:t>1993:</a:t>
+              <a:t>1986:Erweiterung im Bereich der Automobiltechnik mit dem </a:t>
             </a:r>
             <a:r>
               <a:rPr lang="de-DE" b="0" i="0" dirty="0">
@@ -2514,8 +2852,17 @@
                 <a:effectLst/>
                 <a:latin typeface="DINPro"/>
               </a:rPr>
-              <a:t>Erwerb der Mauser Waldeck AG, Aufbau des vierten Unternehmensbereiches Bürosysteme.</a:t>
-            </a:r>
+              <a:t>Erwerb des Vergaserherstellers Pierburg GmbH</a:t>
+            </a:r>
+            <a:endParaRPr lang="de-DE" b="0" i="0" dirty="0">
+              <a:solidFill>
+                <a:srgbClr val="BDC1C6"/>
+              </a:solidFill>
+              <a:effectLst/>
+              <a:latin typeface="arial" panose="020B0604020202020204" pitchFamily="34" charset="0"/>
+            </a:endParaRPr>
+          </a:p>
+          <a:p>
             <a:r>
               <a:rPr lang="de-DE" b="0" i="0" dirty="0">
                 <a:solidFill>
@@ -2524,13 +2871,7 @@
                 <a:effectLst/>
                 <a:latin typeface="arial" panose="020B0604020202020204" pitchFamily="34" charset="0"/>
               </a:rPr>
-              <a:t> Des Weiteren eine Ausweitung im Automobilbereich und der Sicherheitstechnik</a:t>
-            </a:r>
-          </a:p>
-          <a:p>
-            <a:r>
-              <a:rPr lang="de-DE" dirty="0"/>
-              <a:t>2021: </a:t>
+              <a:t>1993:</a:t>
             </a:r>
             <a:r>
               <a:rPr lang="de-DE" b="0" i="0" dirty="0">
@@ -2540,7 +2881,17 @@
                 <a:effectLst/>
                 <a:latin typeface="DINPro"/>
               </a:rPr>
-              <a:t>Die Bereiche unterhalb der Rheinmetall AG, Rheinmetall Defence und Rheinmetall Automotive AG, werden aufgelöst. Direkte Führung der Divisionen:</a:t>
+              <a:t>Erwerb der Mauser Waldeck AG, Aufbau des vierten Unternehmensbereiches Bürosysteme.</a:t>
+            </a:r>
+            <a:r>
+              <a:rPr lang="de-DE" b="0" i="0" dirty="0">
+                <a:solidFill>
+                  <a:srgbClr val="BDC1C6"/>
+                </a:solidFill>
+                <a:effectLst/>
+                <a:latin typeface="arial" panose="020B0604020202020204" pitchFamily="34" charset="0"/>
+              </a:rPr>
+              <a:t> Des Weiteren eine Ausweitung im Automobilbereich und der Sicherheitstechnik</a:t>
             </a:r>
           </a:p>
           <a:p>
@@ -2791,8 +3142,15 @@
           <a:lstStyle/>
           <a:p>
             <a:r>
+              <a:rPr lang="de-DE" dirty="0" err="1"/>
+              <a:t>Redi</a:t>
+            </a:r>
+            <a:endParaRPr lang="de-DE" dirty="0"/>
+          </a:p>
+          <a:p>
+            <a:r>
               <a:rPr lang="de-DE" dirty="0"/>
-              <a:t>Nicolas</a:t>
+              <a:t>ISO 9001 bzw. IATF 16949 und AQAP bzw. EN 9100</a:t>
             </a:r>
           </a:p>
         </p:txBody>
@@ -8143,8 +8501,8 @@
         </p:nvSpPr>
         <p:spPr>
           <a:xfrm>
-            <a:off x="1213945" y="4886075"/>
-            <a:ext cx="3368871" cy="369332"/>
+            <a:off x="1213945" y="4676170"/>
+            <a:ext cx="2315057" cy="276999"/>
           </a:xfrm>
           <a:prstGeom prst="rect">
             <a:avLst/>
@@ -8158,7 +8516,7 @@
           <a:lstStyle/>
           <a:p>
             <a:r>
-              <a:rPr lang="de-DE" dirty="0">
+              <a:rPr lang="de-DE" sz="1200" dirty="0">
                 <a:latin typeface="Times New Roman" panose="02020603050405020304" pitchFamily="18" charset="0"/>
                 <a:cs typeface="Times New Roman" panose="02020603050405020304" pitchFamily="18" charset="0"/>
               </a:rPr>
@@ -22330,7 +22688,7 @@
                 <a:latin typeface="Times New Roman" panose="02020603050405020304" pitchFamily="18" charset="0"/>
                 <a:cs typeface="Times New Roman" panose="02020603050405020304" pitchFamily="18" charset="0"/>
               </a:rPr>
-              <a:t>Gesetzte</a:t>
+              <a:t>Gesetze</a:t>
             </a:r>
           </a:p>
         </p:txBody>

</xml_diff>